<commit_message>
Updated prsentation, added Growth Analysis
</commit_message>
<xml_diff>
--- a/Web Scraping Fortune 500 Archive.pptx
+++ b/Web Scraping Fortune 500 Archive.pptx
@@ -12,16 +12,23 @@
     <p:sldId id="260" r:id="rId6"/>
     <p:sldId id="261" r:id="rId7"/>
     <p:sldId id="262" r:id="rId8"/>
-    <p:sldId id="263" r:id="rId9"/>
-    <p:sldId id="264" r:id="rId10"/>
-    <p:sldId id="265" r:id="rId11"/>
-    <p:sldId id="266" r:id="rId12"/>
-    <p:sldId id="267" r:id="rId13"/>
-    <p:sldId id="268" r:id="rId14"/>
-    <p:sldId id="269" r:id="rId15"/>
-    <p:sldId id="270" r:id="rId16"/>
-    <p:sldId id="271" r:id="rId17"/>
-    <p:sldId id="272" r:id="rId18"/>
+    <p:sldId id="273" r:id="rId9"/>
+    <p:sldId id="263" r:id="rId10"/>
+    <p:sldId id="264" r:id="rId11"/>
+    <p:sldId id="265" r:id="rId12"/>
+    <p:sldId id="266" r:id="rId13"/>
+    <p:sldId id="267" r:id="rId14"/>
+    <p:sldId id="268" r:id="rId15"/>
+    <p:sldId id="269" r:id="rId16"/>
+    <p:sldId id="270" r:id="rId17"/>
+    <p:sldId id="271" r:id="rId18"/>
+    <p:sldId id="272" r:id="rId19"/>
+    <p:sldId id="274" r:id="rId20"/>
+    <p:sldId id="275" r:id="rId21"/>
+    <p:sldId id="276" r:id="rId22"/>
+    <p:sldId id="277" r:id="rId23"/>
+    <p:sldId id="278" r:id="rId24"/>
+    <p:sldId id="279" r:id="rId25"/>
   </p:sldIdLst>
   <p:sldSz cx="12192000" cy="6858000"/>
   <p:notesSz cx="6858000" cy="9144000"/>
@@ -120,6 +127,11 @@
       </a:defRPr>
     </a:lvl9pPr>
   </p:defaultTextStyle>
+  <p:extLst>
+    <p:ext uri="{EFAFB233-063F-42B5-8137-9DF3F51BA10A}">
+      <p15:sldGuideLst xmlns:p15="http://schemas.microsoft.com/office/powerpoint/2012/main"/>
+    </p:ext>
+  </p:extLst>
 </p:presentation>
 </file>
 
@@ -485,10 +497,9 @@
           </a:lstStyle>
           <a:p>
             <a:r>
-              <a:rPr lang="en-US"/>
+              <a:rPr lang="en-US" dirty="0"/>
               <a:t>Click icon to add picture</a:t>
             </a:r>
-            <a:endParaRPr lang="en-US" dirty="0"/>
           </a:p>
         </p:txBody>
       </p:sp>
@@ -2203,10 +2214,9 @@
           </a:lstStyle>
           <a:p>
             <a:r>
-              <a:rPr lang="en-US"/>
+              <a:rPr lang="en-US" dirty="0"/>
               <a:t>Click icon to add picture</a:t>
             </a:r>
-            <a:endParaRPr lang="en-US" dirty="0"/>
           </a:p>
         </p:txBody>
       </p:sp>
@@ -2420,10 +2430,9 @@
           </a:lstStyle>
           <a:p>
             <a:r>
-              <a:rPr lang="en-US"/>
+              <a:rPr lang="en-US" dirty="0"/>
               <a:t>Click icon to add picture</a:t>
             </a:r>
-            <a:endParaRPr lang="en-US" dirty="0"/>
           </a:p>
         </p:txBody>
       </p:sp>
@@ -2637,10 +2646,9 @@
           </a:lstStyle>
           <a:p>
             <a:r>
-              <a:rPr lang="en-US"/>
+              <a:rPr lang="en-US" dirty="0"/>
               <a:t>Click icon to add picture</a:t>
             </a:r>
-            <a:endParaRPr lang="en-US" dirty="0"/>
           </a:p>
         </p:txBody>
       </p:sp>
@@ -4922,10 +4930,9 @@
           </a:lstStyle>
           <a:p>
             <a:r>
-              <a:rPr lang="en-US"/>
+              <a:rPr lang="en-US" dirty="0"/>
               <a:t>Click icon to add picture</a:t>
             </a:r>
-            <a:endParaRPr lang="en-US" dirty="0"/>
           </a:p>
         </p:txBody>
       </p:sp>
@@ -5988,6 +5995,12 @@
               <a:t>Feb 2019</a:t>
             </a:r>
           </a:p>
+          <a:p>
+            <a:r>
+              <a:rPr lang="en-US" dirty="0"/>
+              <a:t>Web Scraping project at NYCDSA</a:t>
+            </a:r>
+          </a:p>
         </p:txBody>
       </p:sp>
     </p:spTree>
@@ -6064,8 +6077,8 @@
           <a:p>
             <a:pPr algn="ctr"/>
             <a:r>
-              <a:rPr lang="en-US" sz="2400" b="1" dirty="0"/>
-              <a:t>Not so fast!</a:t>
+              <a:rPr lang="en-US" dirty="0"/>
+              <a:t>How about we look at how long they have been in the list..</a:t>
             </a:r>
           </a:p>
           <a:p>
@@ -6076,24 +6089,26 @@
             <a:pPr algn="ctr"/>
             <a:r>
               <a:rPr lang="en-US" dirty="0"/>
-              <a:t>Most companies get dropped with in few years after making it to the list</a:t>
+              <a:t>Looks pretty stable</a:t>
             </a:r>
           </a:p>
         </p:txBody>
       </p:sp>
       <p:pic>
         <p:nvPicPr>
-          <p:cNvPr id="8" name="Picture 7">
+          <p:cNvPr id="5" name="Content Placeholder 4">
             <a:extLst>
               <a:ext uri="{FF2B5EF4-FFF2-40B4-BE49-F238E27FC236}">
-                <a16:creationId xmlns:a16="http://schemas.microsoft.com/office/drawing/2014/main" id="{FF3825F8-A62D-4817-8431-60C4524C28CF}"/>
+                <a16:creationId xmlns:a16="http://schemas.microsoft.com/office/drawing/2014/main" id="{624F21B2-CE89-4C79-ADF7-7C4C479051C9}"/>
               </a:ext>
             </a:extLst>
           </p:cNvPr>
           <p:cNvPicPr>
-            <a:picLocks noChangeAspect="1"/>
+            <a:picLocks noGrp="1" noChangeAspect="1"/>
           </p:cNvPicPr>
-          <p:nvPr/>
+          <p:nvPr>
+            <p:ph idx="1"/>
+          </p:nvPr>
         </p:nvPicPr>
         <p:blipFill>
           <a:blip r:embed="rId2"/>
@@ -6103,18 +6118,15 @@
         </p:blipFill>
         <p:spPr>
           <a:xfrm>
-            <a:off x="96818" y="890121"/>
-            <a:ext cx="9681522" cy="5099273"/>
-          </a:xfrm>
-          <a:prstGeom prst="rect">
-            <a:avLst/>
-          </a:prstGeom>
+            <a:off x="2729057" y="434647"/>
+            <a:ext cx="5131538" cy="6187719"/>
+          </a:xfrm>
         </p:spPr>
       </p:pic>
     </p:spTree>
     <p:extLst>
       <p:ext uri="{BB962C8B-B14F-4D97-AF65-F5344CB8AC3E}">
-        <p14:creationId xmlns:p14="http://schemas.microsoft.com/office/powerpoint/2010/main" val="2303228060"/>
+        <p14:creationId xmlns:p14="http://schemas.microsoft.com/office/powerpoint/2010/main" val="2319040622"/>
       </p:ext>
     </p:extLst>
   </p:cSld>
@@ -6184,23 +6196,30 @@
           <a:lstStyle/>
           <a:p>
             <a:pPr algn="ctr"/>
-            <a:endParaRPr lang="en-US" dirty="0"/>
+            <a:r>
+              <a:rPr lang="en-US" sz="2400" b="1" dirty="0"/>
+              <a:t>Not so fast!</a:t>
+            </a:r>
           </a:p>
           <a:p>
             <a:pPr algn="ctr"/>
+            <a:endParaRPr lang="en-US" dirty="0"/>
+          </a:p>
+          <a:p>
+            <a:pPr algn="ctr"/>
             <a:r>
               <a:rPr lang="en-US" dirty="0"/>
-              <a:t>Another view, in 5 year bins</a:t>
+              <a:t>Most companies get dropped with in few years after making it to the list</a:t>
             </a:r>
           </a:p>
         </p:txBody>
       </p:sp>
       <p:pic>
         <p:nvPicPr>
-          <p:cNvPr id="3" name="Picture 2">
+          <p:cNvPr id="8" name="Picture 7">
             <a:extLst>
               <a:ext uri="{FF2B5EF4-FFF2-40B4-BE49-F238E27FC236}">
-                <a16:creationId xmlns:a16="http://schemas.microsoft.com/office/drawing/2014/main" id="{E91BEAA4-8A3D-4AF6-A4E3-BCB0CDB4CBB8}"/>
+                <a16:creationId xmlns:a16="http://schemas.microsoft.com/office/drawing/2014/main" id="{FF3825F8-A62D-4817-8431-60C4524C28CF}"/>
               </a:ext>
             </a:extLst>
           </p:cNvPr>
@@ -6217,8 +6236,8 @@
         </p:blipFill>
         <p:spPr>
           <a:xfrm>
-            <a:off x="317188" y="333729"/>
-            <a:ext cx="9298518" cy="6389556"/>
+            <a:off x="96818" y="890121"/>
+            <a:ext cx="9681522" cy="5099273"/>
           </a:xfrm>
           <a:prstGeom prst="rect">
             <a:avLst/>
@@ -6228,7 +6247,7 @@
     </p:spTree>
     <p:extLst>
       <p:ext uri="{BB962C8B-B14F-4D97-AF65-F5344CB8AC3E}">
-        <p14:creationId xmlns:p14="http://schemas.microsoft.com/office/powerpoint/2010/main" val="3205530045"/>
+        <p14:creationId xmlns:p14="http://schemas.microsoft.com/office/powerpoint/2010/main" val="2303228060"/>
       </p:ext>
     </p:extLst>
   </p:cSld>
@@ -6304,52 +6323,17 @@
             <a:pPr algn="ctr"/>
             <a:r>
               <a:rPr lang="en-US" dirty="0"/>
-              <a:t>On Average there is </a:t>
-            </a:r>
-            <a:r>
-              <a:rPr lang="en-US" sz="2400" b="1" dirty="0"/>
-              <a:t>5%</a:t>
-            </a:r>
-            <a:r>
-              <a:rPr lang="en-US" dirty="0"/>
-              <a:t> to </a:t>
-            </a:r>
-            <a:r>
-              <a:rPr lang="en-US" sz="2400" b="1" dirty="0"/>
-              <a:t>10% </a:t>
-            </a:r>
-            <a:r>
-              <a:rPr lang="en-US" dirty="0"/>
-              <a:t>churn in the companies listed in Fortune 500</a:t>
-            </a:r>
-          </a:p>
-          <a:p>
-            <a:pPr algn="ctr"/>
-            <a:endParaRPr lang="en-US" dirty="0"/>
-          </a:p>
-          <a:p>
-            <a:pPr algn="ctr"/>
-            <a:endParaRPr lang="en-US" dirty="0"/>
-          </a:p>
-          <a:p>
-            <a:pPr algn="ctr"/>
-            <a:r>
-              <a:rPr lang="en-US" dirty="0">
-                <a:solidFill>
-                  <a:srgbClr val="92D050"/>
-                </a:solidFill>
-              </a:rPr>
-              <a:t>1995 seems like some kind of methodology change resulting in spike</a:t>
+              <a:t>Another view, in 5 year bins</a:t>
             </a:r>
           </a:p>
         </p:txBody>
       </p:sp>
       <p:pic>
         <p:nvPicPr>
-          <p:cNvPr id="4" name="Picture 3">
+          <p:cNvPr id="3" name="Picture 2">
             <a:extLst>
               <a:ext uri="{FF2B5EF4-FFF2-40B4-BE49-F238E27FC236}">
-                <a16:creationId xmlns:a16="http://schemas.microsoft.com/office/drawing/2014/main" id="{6F1BCF7A-8AEE-4CAE-A81C-7FCBB0AA7F0E}"/>
+                <a16:creationId xmlns:a16="http://schemas.microsoft.com/office/drawing/2014/main" id="{E91BEAA4-8A3D-4AF6-A4E3-BCB0CDB4CBB8}"/>
               </a:ext>
             </a:extLst>
           </p:cNvPr>
@@ -6366,8 +6350,8 @@
         </p:blipFill>
         <p:spPr>
           <a:xfrm>
-            <a:off x="85858" y="846716"/>
-            <a:ext cx="9640552" cy="5229116"/>
+            <a:off x="317188" y="333729"/>
+            <a:ext cx="9298518" cy="6389556"/>
           </a:xfrm>
           <a:prstGeom prst="rect">
             <a:avLst/>
@@ -6377,7 +6361,7 @@
     </p:spTree>
     <p:extLst>
       <p:ext uri="{BB962C8B-B14F-4D97-AF65-F5344CB8AC3E}">
-        <p14:creationId xmlns:p14="http://schemas.microsoft.com/office/powerpoint/2010/main" val="2018500754"/>
+        <p14:creationId xmlns:p14="http://schemas.microsoft.com/office/powerpoint/2010/main" val="3205530045"/>
       </p:ext>
     </p:extLst>
   </p:cSld>
@@ -6451,27 +6435,54 @@
           </a:p>
           <a:p>
             <a:pPr algn="ctr"/>
-            <a:endParaRPr lang="en-US" dirty="0"/>
+            <a:r>
+              <a:rPr lang="en-US" dirty="0"/>
+              <a:t>On Average there is </a:t>
+            </a:r>
+            <a:r>
+              <a:rPr lang="en-US" sz="2400" b="1" dirty="0"/>
+              <a:t>5%</a:t>
+            </a:r>
+            <a:r>
+              <a:rPr lang="en-US" dirty="0"/>
+              <a:t> to </a:t>
+            </a:r>
+            <a:r>
+              <a:rPr lang="en-US" sz="2400" b="1" dirty="0"/>
+              <a:t>10% </a:t>
+            </a:r>
+            <a:r>
+              <a:rPr lang="en-US" dirty="0"/>
+              <a:t>churn in the companies listed in Fortune 500</a:t>
+            </a:r>
           </a:p>
           <a:p>
             <a:pPr algn="ctr"/>
-            <a:r>
-              <a:rPr lang="en-US" dirty="0"/>
-              <a:t>Let us start deep dive with average Revenue and Profits</a:t>
-            </a:r>
+            <a:endParaRPr lang="en-US" dirty="0"/>
           </a:p>
           <a:p>
             <a:pPr algn="ctr"/>
             <a:endParaRPr lang="en-US" dirty="0"/>
+          </a:p>
+          <a:p>
+            <a:pPr algn="ctr"/>
+            <a:r>
+              <a:rPr lang="en-US" dirty="0">
+                <a:solidFill>
+                  <a:srgbClr val="92D050"/>
+                </a:solidFill>
+              </a:rPr>
+              <a:t>1995 seems like some kind of methodology change resulting in spike</a:t>
+            </a:r>
           </a:p>
         </p:txBody>
       </p:sp>
       <p:pic>
         <p:nvPicPr>
-          <p:cNvPr id="3" name="Picture 2">
+          <p:cNvPr id="4" name="Picture 3">
             <a:extLst>
               <a:ext uri="{FF2B5EF4-FFF2-40B4-BE49-F238E27FC236}">
-                <a16:creationId xmlns:a16="http://schemas.microsoft.com/office/drawing/2014/main" id="{A891CE1A-6672-45BD-B679-5CB22891DF2F}"/>
+                <a16:creationId xmlns:a16="http://schemas.microsoft.com/office/drawing/2014/main" id="{6F1BCF7A-8AEE-4CAE-A81C-7FCBB0AA7F0E}"/>
               </a:ext>
             </a:extLst>
           </p:cNvPr>
@@ -6488,38 +6499,8 @@
         </p:blipFill>
         <p:spPr>
           <a:xfrm>
-            <a:off x="0" y="0"/>
-            <a:ext cx="9757186" cy="3550024"/>
-          </a:xfrm>
-          <a:prstGeom prst="rect">
-            <a:avLst/>
-          </a:prstGeom>
-        </p:spPr>
-      </p:pic>
-      <p:pic>
-        <p:nvPicPr>
-          <p:cNvPr id="6" name="Picture 5">
-            <a:extLst>
-              <a:ext uri="{FF2B5EF4-FFF2-40B4-BE49-F238E27FC236}">
-                <a16:creationId xmlns:a16="http://schemas.microsoft.com/office/drawing/2014/main" id="{E0907ED8-55DB-467F-9BB7-AB05C2C9C50D}"/>
-              </a:ext>
-            </a:extLst>
-          </p:cNvPr>
-          <p:cNvPicPr>
-            <a:picLocks noChangeAspect="1"/>
-          </p:cNvPicPr>
-          <p:nvPr/>
-        </p:nvPicPr>
-        <p:blipFill>
-          <a:blip r:embed="rId3"/>
-          <a:stretch>
-            <a:fillRect/>
-          </a:stretch>
-        </p:blipFill>
-        <p:spPr>
-          <a:xfrm>
-            <a:off x="-2366" y="3528507"/>
-            <a:ext cx="9759552" cy="3227296"/>
+            <a:off x="85858" y="846716"/>
+            <a:ext cx="9640552" cy="5229116"/>
           </a:xfrm>
           <a:prstGeom prst="rect">
             <a:avLst/>
@@ -6529,7 +6510,7 @@
     </p:spTree>
     <p:extLst>
       <p:ext uri="{BB962C8B-B14F-4D97-AF65-F5344CB8AC3E}">
-        <p14:creationId xmlns:p14="http://schemas.microsoft.com/office/powerpoint/2010/main" val="644426648"/>
+        <p14:creationId xmlns:p14="http://schemas.microsoft.com/office/powerpoint/2010/main" val="2018500754"/>
       </p:ext>
     </p:extLst>
   </p:cSld>
@@ -6609,7 +6590,7 @@
             <a:pPr algn="ctr"/>
             <a:r>
               <a:rPr lang="en-US" dirty="0"/>
-              <a:t>However, there is considerable gap between Companies that are still in the list and that are not</a:t>
+              <a:t>Let us start deep dive with average Revenue and Profits</a:t>
             </a:r>
           </a:p>
           <a:p>
@@ -6620,10 +6601,10 @@
       </p:sp>
       <p:pic>
         <p:nvPicPr>
-          <p:cNvPr id="4" name="Picture 3">
+          <p:cNvPr id="3" name="Picture 2">
             <a:extLst>
               <a:ext uri="{FF2B5EF4-FFF2-40B4-BE49-F238E27FC236}">
-                <a16:creationId xmlns:a16="http://schemas.microsoft.com/office/drawing/2014/main" id="{38DB92B3-7C99-4914-A184-1CC9F6E8B3DE}"/>
+                <a16:creationId xmlns:a16="http://schemas.microsoft.com/office/drawing/2014/main" id="{A891CE1A-6672-45BD-B679-5CB22891DF2F}"/>
               </a:ext>
             </a:extLst>
           </p:cNvPr>
@@ -6640,8 +6621,8 @@
         </p:blipFill>
         <p:spPr>
           <a:xfrm>
-            <a:off x="43032" y="107460"/>
-            <a:ext cx="9746428" cy="3222033"/>
+            <a:off x="0" y="0"/>
+            <a:ext cx="9757186" cy="3550024"/>
           </a:xfrm>
           <a:prstGeom prst="rect">
             <a:avLst/>
@@ -6650,10 +6631,10 @@
       </p:pic>
       <p:pic>
         <p:nvPicPr>
-          <p:cNvPr id="7" name="Picture 6">
+          <p:cNvPr id="6" name="Picture 5">
             <a:extLst>
               <a:ext uri="{FF2B5EF4-FFF2-40B4-BE49-F238E27FC236}">
-                <a16:creationId xmlns:a16="http://schemas.microsoft.com/office/drawing/2014/main" id="{0DB4C1F2-30DF-4763-AD76-56A65F036AF1}"/>
+                <a16:creationId xmlns:a16="http://schemas.microsoft.com/office/drawing/2014/main" id="{E0907ED8-55DB-467F-9BB7-AB05C2C9C50D}"/>
               </a:ext>
             </a:extLst>
           </p:cNvPr>
@@ -6670,8 +6651,8 @@
         </p:blipFill>
         <p:spPr>
           <a:xfrm>
-            <a:off x="43032" y="3345621"/>
-            <a:ext cx="9746428" cy="3404919"/>
+            <a:off x="-2366" y="3528507"/>
+            <a:ext cx="9759552" cy="3227296"/>
           </a:xfrm>
           <a:prstGeom prst="rect">
             <a:avLst/>
@@ -6681,7 +6662,7 @@
     </p:spTree>
     <p:extLst>
       <p:ext uri="{BB962C8B-B14F-4D97-AF65-F5344CB8AC3E}">
-        <p14:creationId xmlns:p14="http://schemas.microsoft.com/office/powerpoint/2010/main" val="1916071162"/>
+        <p14:creationId xmlns:p14="http://schemas.microsoft.com/office/powerpoint/2010/main" val="644426648"/>
       </p:ext>
     </p:extLst>
   </p:cSld>
@@ -6761,7 +6742,7 @@
             <a:pPr algn="ctr"/>
             <a:r>
               <a:rPr lang="en-US" dirty="0"/>
-              <a:t>Profits by period bins – relatively trending up for companies still in the list</a:t>
+              <a:t>However, there is considerable gap between Companies that are still in the list and that are not</a:t>
             </a:r>
           </a:p>
           <a:p>
@@ -6772,10 +6753,10 @@
       </p:sp>
       <p:pic>
         <p:nvPicPr>
-          <p:cNvPr id="3" name="Picture 2">
+          <p:cNvPr id="4" name="Picture 3">
             <a:extLst>
               <a:ext uri="{FF2B5EF4-FFF2-40B4-BE49-F238E27FC236}">
-                <a16:creationId xmlns:a16="http://schemas.microsoft.com/office/drawing/2014/main" id="{E8BFE3B0-5BAC-40C9-965C-0846B7A406E4}"/>
+                <a16:creationId xmlns:a16="http://schemas.microsoft.com/office/drawing/2014/main" id="{38DB92B3-7C99-4914-A184-1CC9F6E8B3DE}"/>
               </a:ext>
             </a:extLst>
           </p:cNvPr>
@@ -6792,8 +6773,8 @@
         </p:blipFill>
         <p:spPr>
           <a:xfrm>
-            <a:off x="11314" y="62094"/>
-            <a:ext cx="9713599" cy="3366905"/>
+            <a:off x="43032" y="107460"/>
+            <a:ext cx="9746428" cy="3222033"/>
           </a:xfrm>
           <a:prstGeom prst="rect">
             <a:avLst/>
@@ -6802,10 +6783,10 @@
       </p:pic>
       <p:pic>
         <p:nvPicPr>
-          <p:cNvPr id="6" name="Picture 5">
+          <p:cNvPr id="7" name="Picture 6">
             <a:extLst>
               <a:ext uri="{FF2B5EF4-FFF2-40B4-BE49-F238E27FC236}">
-                <a16:creationId xmlns:a16="http://schemas.microsoft.com/office/drawing/2014/main" id="{971018BA-6126-4D8A-97E1-742933509B0E}"/>
+                <a16:creationId xmlns:a16="http://schemas.microsoft.com/office/drawing/2014/main" id="{0DB4C1F2-30DF-4763-AD76-56A65F036AF1}"/>
               </a:ext>
             </a:extLst>
           </p:cNvPr>
@@ -6822,8 +6803,8 @@
         </p:blipFill>
         <p:spPr>
           <a:xfrm>
-            <a:off x="10758" y="3428999"/>
-            <a:ext cx="9713599" cy="3366907"/>
+            <a:off x="43032" y="3345621"/>
+            <a:ext cx="9746428" cy="3404919"/>
           </a:xfrm>
           <a:prstGeom prst="rect">
             <a:avLst/>
@@ -6833,7 +6814,7 @@
     </p:spTree>
     <p:extLst>
       <p:ext uri="{BB962C8B-B14F-4D97-AF65-F5344CB8AC3E}">
-        <p14:creationId xmlns:p14="http://schemas.microsoft.com/office/powerpoint/2010/main" val="2835709693"/>
+        <p14:creationId xmlns:p14="http://schemas.microsoft.com/office/powerpoint/2010/main" val="1916071162"/>
       </p:ext>
     </p:extLst>
   </p:cSld>
@@ -6913,7 +6894,7 @@
             <a:pPr algn="ctr"/>
             <a:r>
               <a:rPr lang="en-US" dirty="0"/>
-              <a:t>Revenue by period bins – relatively trending up for companies still in the list</a:t>
+              <a:t>Profits by period bins – relatively trending up for companies still in the list</a:t>
             </a:r>
           </a:p>
           <a:p>
@@ -6924,10 +6905,10 @@
       </p:sp>
       <p:pic>
         <p:nvPicPr>
-          <p:cNvPr id="4" name="Picture 3">
+          <p:cNvPr id="3" name="Picture 2">
             <a:extLst>
               <a:ext uri="{FF2B5EF4-FFF2-40B4-BE49-F238E27FC236}">
-                <a16:creationId xmlns:a16="http://schemas.microsoft.com/office/drawing/2014/main" id="{30F0FFF9-8FFF-404F-9170-4F48A485B4DD}"/>
+                <a16:creationId xmlns:a16="http://schemas.microsoft.com/office/drawing/2014/main" id="{E8BFE3B0-5BAC-40C9-965C-0846B7A406E4}"/>
               </a:ext>
             </a:extLst>
           </p:cNvPr>
@@ -6944,8 +6925,8 @@
         </p:blipFill>
         <p:spPr>
           <a:xfrm>
-            <a:off x="0" y="29471"/>
-            <a:ext cx="9803105" cy="3399529"/>
+            <a:off x="11314" y="62094"/>
+            <a:ext cx="9713599" cy="3366905"/>
           </a:xfrm>
           <a:prstGeom prst="rect">
             <a:avLst/>
@@ -6954,10 +6935,10 @@
       </p:pic>
       <p:pic>
         <p:nvPicPr>
-          <p:cNvPr id="14" name="Picture 13">
+          <p:cNvPr id="6" name="Picture 5">
             <a:extLst>
               <a:ext uri="{FF2B5EF4-FFF2-40B4-BE49-F238E27FC236}">
-                <a16:creationId xmlns:a16="http://schemas.microsoft.com/office/drawing/2014/main" id="{2AF3EF2B-B05D-4074-AF8F-19BA6E655F2D}"/>
+                <a16:creationId xmlns:a16="http://schemas.microsoft.com/office/drawing/2014/main" id="{971018BA-6126-4D8A-97E1-742933509B0E}"/>
               </a:ext>
             </a:extLst>
           </p:cNvPr>
@@ -6974,8 +6955,8 @@
         </p:blipFill>
         <p:spPr>
           <a:xfrm>
-            <a:off x="0" y="3429000"/>
-            <a:ext cx="9803105" cy="3313468"/>
+            <a:off x="10758" y="3428999"/>
+            <a:ext cx="9713599" cy="3366907"/>
           </a:xfrm>
           <a:prstGeom prst="rect">
             <a:avLst/>
@@ -6985,7 +6966,7 @@
     </p:spTree>
     <p:extLst>
       <p:ext uri="{BB962C8B-B14F-4D97-AF65-F5344CB8AC3E}">
-        <p14:creationId xmlns:p14="http://schemas.microsoft.com/office/powerpoint/2010/main" val="4165032875"/>
+        <p14:creationId xmlns:p14="http://schemas.microsoft.com/office/powerpoint/2010/main" val="2835709693"/>
       </p:ext>
     </p:extLst>
   </p:cSld>
@@ -7079,7 +7060,7 @@
           <p:cNvPr id="3" name="Picture 2">
             <a:extLst>
               <a:ext uri="{FF2B5EF4-FFF2-40B4-BE49-F238E27FC236}">
-                <a16:creationId xmlns:a16="http://schemas.microsoft.com/office/drawing/2014/main" id="{85980885-13EC-4386-8C59-75CD56131404}"/>
+                <a16:creationId xmlns:a16="http://schemas.microsoft.com/office/drawing/2014/main" id="{ABAEED1E-6F67-401C-A3B0-B1A129393FD2}"/>
               </a:ext>
             </a:extLst>
           </p:cNvPr>
@@ -7096,8 +7077,8 @@
         </p:blipFill>
         <p:spPr>
           <a:xfrm>
-            <a:off x="355001" y="107578"/>
-            <a:ext cx="4405481" cy="6669741"/>
+            <a:off x="32830" y="105127"/>
+            <a:ext cx="9735114" cy="3323874"/>
           </a:xfrm>
           <a:prstGeom prst="rect">
             <a:avLst/>
@@ -7109,7 +7090,7 @@
           <p:cNvPr id="6" name="Picture 5">
             <a:extLst>
               <a:ext uri="{FF2B5EF4-FFF2-40B4-BE49-F238E27FC236}">
-                <a16:creationId xmlns:a16="http://schemas.microsoft.com/office/drawing/2014/main" id="{C36BD7BB-881F-4423-92B8-1278BC3B9CAA}"/>
+                <a16:creationId xmlns:a16="http://schemas.microsoft.com/office/drawing/2014/main" id="{74AE4965-3946-4E05-842A-A1F214967300}"/>
               </a:ext>
             </a:extLst>
           </p:cNvPr>
@@ -7126,8 +7107,160 @@
         </p:blipFill>
         <p:spPr>
           <a:xfrm>
-            <a:off x="4760482" y="107578"/>
-            <a:ext cx="4813823" cy="6669741"/>
+            <a:off x="21743" y="3428999"/>
+            <a:ext cx="9757288" cy="3323874"/>
+          </a:xfrm>
+          <a:prstGeom prst="rect">
+            <a:avLst/>
+          </a:prstGeom>
+        </p:spPr>
+      </p:pic>
+    </p:spTree>
+    <p:extLst>
+      <p:ext uri="{BB962C8B-B14F-4D97-AF65-F5344CB8AC3E}">
+        <p14:creationId xmlns:p14="http://schemas.microsoft.com/office/powerpoint/2010/main" val="4165032875"/>
+      </p:ext>
+    </p:extLst>
+  </p:cSld>
+  <p:clrMapOvr>
+    <a:masterClrMapping/>
+  </p:clrMapOvr>
+</p:sld>
+</file>
+
+<file path=ppt/slides/slide18.xml><?xml version="1.0" encoding="utf-8"?>
+<p:sld xmlns:a="http://schemas.openxmlformats.org/drawingml/2006/main" xmlns:r="http://schemas.openxmlformats.org/officeDocument/2006/relationships" xmlns:p="http://schemas.openxmlformats.org/presentationml/2006/main">
+  <p:cSld>
+    <p:spTree>
+      <p:nvGrpSpPr>
+        <p:cNvPr id="1" name=""/>
+        <p:cNvGrpSpPr/>
+        <p:nvPr/>
+      </p:nvGrpSpPr>
+      <p:grpSpPr>
+        <a:xfrm>
+          <a:off x="0" y="0"/>
+          <a:ext cx="0" cy="0"/>
+          <a:chOff x="0" y="0"/>
+          <a:chExt cx="0" cy="0"/>
+        </a:xfrm>
+      </p:grpSpPr>
+      <p:sp>
+        <p:nvSpPr>
+          <p:cNvPr id="10" name="Rectangle 9">
+            <a:extLst>
+              <a:ext uri="{FF2B5EF4-FFF2-40B4-BE49-F238E27FC236}">
+                <a16:creationId xmlns:a16="http://schemas.microsoft.com/office/drawing/2014/main" id="{9F0C2FE5-058E-4C07-89EA-CB4C7C754C5F}"/>
+              </a:ext>
+            </a:extLst>
+          </p:cNvPr>
+          <p:cNvSpPr/>
+          <p:nvPr/>
+        </p:nvSpPr>
+        <p:spPr>
+          <a:xfrm>
+            <a:off x="9832490" y="1161825"/>
+            <a:ext cx="1904103" cy="4733365"/>
+          </a:xfrm>
+          <a:prstGeom prst="rect">
+            <a:avLst/>
+          </a:prstGeom>
+          <a:noFill/>
+        </p:spPr>
+        <p:style>
+          <a:lnRef idx="2">
+            <a:schemeClr val="accent1">
+              <a:shade val="50000"/>
+            </a:schemeClr>
+          </a:lnRef>
+          <a:fillRef idx="1">
+            <a:schemeClr val="accent1"/>
+          </a:fillRef>
+          <a:effectRef idx="0">
+            <a:schemeClr val="accent1"/>
+          </a:effectRef>
+          <a:fontRef idx="minor">
+            <a:schemeClr val="lt1"/>
+          </a:fontRef>
+        </p:style>
+        <p:txBody>
+          <a:bodyPr rtlCol="0" anchor="ctr"/>
+          <a:lstStyle/>
+          <a:p>
+            <a:pPr algn="ctr"/>
+            <a:endParaRPr lang="en-US" dirty="0"/>
+          </a:p>
+          <a:p>
+            <a:pPr algn="ctr"/>
+            <a:endParaRPr lang="en-US" dirty="0"/>
+          </a:p>
+          <a:p>
+            <a:pPr algn="ctr"/>
+            <a:r>
+              <a:rPr lang="en-US" dirty="0"/>
+              <a:t>Revenue by period bins – relatively trending up for companies still in the list</a:t>
+            </a:r>
+          </a:p>
+          <a:p>
+            <a:pPr algn="ctr"/>
+            <a:endParaRPr lang="en-US" dirty="0"/>
+          </a:p>
+        </p:txBody>
+      </p:sp>
+      <p:pic>
+        <p:nvPicPr>
+          <p:cNvPr id="9" name="Picture 8">
+            <a:extLst>
+              <a:ext uri="{FF2B5EF4-FFF2-40B4-BE49-F238E27FC236}">
+                <a16:creationId xmlns:a16="http://schemas.microsoft.com/office/drawing/2014/main" id="{BBC6D7D7-AC84-4A4F-AA65-3C228F824CCB}"/>
+              </a:ext>
+            </a:extLst>
+          </p:cNvPr>
+          <p:cNvPicPr>
+            <a:picLocks noChangeAspect="1"/>
+          </p:cNvPicPr>
+          <p:nvPr/>
+        </p:nvPicPr>
+        <p:blipFill>
+          <a:blip r:embed="rId2"/>
+          <a:stretch>
+            <a:fillRect/>
+          </a:stretch>
+        </p:blipFill>
+        <p:spPr>
+          <a:xfrm>
+            <a:off x="0" y="0"/>
+            <a:ext cx="4894729" cy="6858000"/>
+          </a:xfrm>
+          <a:prstGeom prst="rect">
+            <a:avLst/>
+          </a:prstGeom>
+        </p:spPr>
+      </p:pic>
+      <p:pic>
+        <p:nvPicPr>
+          <p:cNvPr id="12" name="Picture 11">
+            <a:extLst>
+              <a:ext uri="{FF2B5EF4-FFF2-40B4-BE49-F238E27FC236}">
+                <a16:creationId xmlns:a16="http://schemas.microsoft.com/office/drawing/2014/main" id="{14070E8E-D7C5-4AC7-A03E-0FB20092FB5F}"/>
+              </a:ext>
+            </a:extLst>
+          </p:cNvPr>
+          <p:cNvPicPr>
+            <a:picLocks noChangeAspect="1"/>
+          </p:cNvPicPr>
+          <p:nvPr/>
+        </p:nvPicPr>
+        <p:blipFill>
+          <a:blip r:embed="rId3"/>
+          <a:stretch>
+            <a:fillRect/>
+          </a:stretch>
+        </p:blipFill>
+        <p:spPr>
+          <a:xfrm>
+            <a:off x="4900814" y="10758"/>
+            <a:ext cx="4870173" cy="6858000"/>
           </a:xfrm>
           <a:prstGeom prst="rect">
             <a:avLst/>
@@ -7138,6 +7271,128 @@
     <p:extLst>
       <p:ext uri="{BB962C8B-B14F-4D97-AF65-F5344CB8AC3E}">
         <p14:creationId xmlns:p14="http://schemas.microsoft.com/office/powerpoint/2010/main" val="2816595580"/>
+      </p:ext>
+    </p:extLst>
+  </p:cSld>
+  <p:clrMapOvr>
+    <a:masterClrMapping/>
+  </p:clrMapOvr>
+</p:sld>
+</file>
+
+<file path=ppt/slides/slide19.xml><?xml version="1.0" encoding="utf-8"?>
+<p:sld xmlns:a="http://schemas.openxmlformats.org/drawingml/2006/main" xmlns:r="http://schemas.openxmlformats.org/officeDocument/2006/relationships" xmlns:p="http://schemas.openxmlformats.org/presentationml/2006/main">
+  <p:cSld>
+    <p:spTree>
+      <p:nvGrpSpPr>
+        <p:cNvPr id="1" name=""/>
+        <p:cNvGrpSpPr/>
+        <p:nvPr/>
+      </p:nvGrpSpPr>
+      <p:grpSpPr>
+        <a:xfrm>
+          <a:off x="0" y="0"/>
+          <a:ext cx="0" cy="0"/>
+          <a:chOff x="0" y="0"/>
+          <a:chExt cx="0" cy="0"/>
+        </a:xfrm>
+      </p:grpSpPr>
+      <p:sp>
+        <p:nvSpPr>
+          <p:cNvPr id="10" name="Rectangle 9">
+            <a:extLst>
+              <a:ext uri="{FF2B5EF4-FFF2-40B4-BE49-F238E27FC236}">
+                <a16:creationId xmlns:a16="http://schemas.microsoft.com/office/drawing/2014/main" id="{9F0C2FE5-058E-4C07-89EA-CB4C7C754C5F}"/>
+              </a:ext>
+            </a:extLst>
+          </p:cNvPr>
+          <p:cNvSpPr/>
+          <p:nvPr/>
+        </p:nvSpPr>
+        <p:spPr>
+          <a:xfrm>
+            <a:off x="9832490" y="1161825"/>
+            <a:ext cx="1904103" cy="4733365"/>
+          </a:xfrm>
+          <a:prstGeom prst="rect">
+            <a:avLst/>
+          </a:prstGeom>
+          <a:noFill/>
+        </p:spPr>
+        <p:style>
+          <a:lnRef idx="2">
+            <a:schemeClr val="accent1">
+              <a:shade val="50000"/>
+            </a:schemeClr>
+          </a:lnRef>
+          <a:fillRef idx="1">
+            <a:schemeClr val="accent1"/>
+          </a:fillRef>
+          <a:effectRef idx="0">
+            <a:schemeClr val="accent1"/>
+          </a:effectRef>
+          <a:fontRef idx="minor">
+            <a:schemeClr val="lt1"/>
+          </a:fontRef>
+        </p:style>
+        <p:txBody>
+          <a:bodyPr rtlCol="0" anchor="ctr"/>
+          <a:lstStyle/>
+          <a:p>
+            <a:pPr algn="ctr"/>
+            <a:endParaRPr lang="en-US" dirty="0"/>
+          </a:p>
+          <a:p>
+            <a:pPr algn="ctr"/>
+            <a:endParaRPr lang="en-US" dirty="0"/>
+          </a:p>
+          <a:p>
+            <a:pPr algn="ctr"/>
+            <a:r>
+              <a:rPr lang="en-US" dirty="0"/>
+              <a:t>To be more concrete, let us look at 2012 list</a:t>
+            </a:r>
+          </a:p>
+          <a:p>
+            <a:pPr algn="ctr"/>
+            <a:endParaRPr lang="en-US" dirty="0"/>
+          </a:p>
+        </p:txBody>
+      </p:sp>
+      <p:pic>
+        <p:nvPicPr>
+          <p:cNvPr id="3" name="Picture 2">
+            <a:extLst>
+              <a:ext uri="{FF2B5EF4-FFF2-40B4-BE49-F238E27FC236}">
+                <a16:creationId xmlns:a16="http://schemas.microsoft.com/office/drawing/2014/main" id="{7326A36B-2B7C-4517-82C1-4B42354BC2EC}"/>
+              </a:ext>
+            </a:extLst>
+          </p:cNvPr>
+          <p:cNvPicPr>
+            <a:picLocks noChangeAspect="1"/>
+          </p:cNvPicPr>
+          <p:nvPr/>
+        </p:nvPicPr>
+        <p:blipFill>
+          <a:blip r:embed="rId2"/>
+          <a:stretch>
+            <a:fillRect/>
+          </a:stretch>
+        </p:blipFill>
+        <p:spPr>
+          <a:xfrm>
+            <a:off x="2288176" y="0"/>
+            <a:ext cx="5743815" cy="6858000"/>
+          </a:xfrm>
+          <a:prstGeom prst="rect">
+            <a:avLst/>
+          </a:prstGeom>
+        </p:spPr>
+      </p:pic>
+    </p:spTree>
+    <p:extLst>
+      <p:ext uri="{BB962C8B-B14F-4D97-AF65-F5344CB8AC3E}">
+        <p14:creationId xmlns:p14="http://schemas.microsoft.com/office/powerpoint/2010/main" val="1929122268"/>
       </p:ext>
     </p:extLst>
   </p:cSld>
@@ -7214,38 +7469,54 @@
           <a:lstStyle/>
           <a:p>
             <a:r>
-              <a:rPr lang="en-US" dirty="0"/>
-              <a:t>Be able to scrape Fortune 500 archive website</a:t>
-            </a:r>
-          </a:p>
-          <a:p>
-            <a:r>
-              <a:rPr lang="en-US" dirty="0"/>
-              <a:t>Clean the scrapped data and organize</a:t>
-            </a:r>
-          </a:p>
-          <a:p>
-            <a:r>
-              <a:rPr lang="en-US" dirty="0"/>
-              <a:t>Utilize the data for analysis</a:t>
-            </a:r>
-          </a:p>
-          <a:p>
-            <a:r>
-              <a:rPr lang="en-US" dirty="0"/>
-              <a:t>Big question:</a:t>
-            </a:r>
-          </a:p>
-          <a:p>
-            <a:pPr marL="0" indent="0">
-              <a:buNone/>
-            </a:pPr>
-            <a:r>
-              <a:rPr lang="en-US" sz="3200" dirty="0">
+              <a:rPr lang="en-US" dirty="0">
                 <a:solidFill>
                   <a:srgbClr val="92D050"/>
                 </a:solidFill>
               </a:rPr>
+              <a:t>Be able to scrape Fortune 500 archive website</a:t>
+            </a:r>
+          </a:p>
+          <a:p>
+            <a:r>
+              <a:rPr lang="en-US" dirty="0">
+                <a:solidFill>
+                  <a:srgbClr val="92D050"/>
+                </a:solidFill>
+              </a:rPr>
+              <a:t>Clean the scrapped data and organize</a:t>
+            </a:r>
+          </a:p>
+          <a:p>
+            <a:r>
+              <a:rPr lang="en-US" dirty="0">
+                <a:solidFill>
+                  <a:srgbClr val="92D050"/>
+                </a:solidFill>
+              </a:rPr>
+              <a:t>Utilize the data for analysis</a:t>
+            </a:r>
+          </a:p>
+          <a:p>
+            <a:r>
+              <a:rPr lang="en-US" dirty="0">
+                <a:solidFill>
+                  <a:srgbClr val="92D050"/>
+                </a:solidFill>
+              </a:rPr>
+              <a:t>Big question:</a:t>
+            </a:r>
+          </a:p>
+          <a:p>
+            <a:pPr marL="400050" lvl="1" indent="0">
+              <a:buNone/>
+            </a:pPr>
+            <a:r>
+              <a:rPr lang="en-US" sz="3200" b="1" dirty="0">
+                <a:solidFill>
+                  <a:srgbClr val="FFC000"/>
+                </a:solidFill>
+              </a:rPr>
               <a:t>Will following additions and deletions from Fortune 500 help with investing?</a:t>
             </a:r>
           </a:p>
@@ -7255,6 +7526,741 @@
     <p:extLst>
       <p:ext uri="{BB962C8B-B14F-4D97-AF65-F5344CB8AC3E}">
         <p14:creationId xmlns:p14="http://schemas.microsoft.com/office/powerpoint/2010/main" val="2434859415"/>
+      </p:ext>
+    </p:extLst>
+  </p:cSld>
+  <p:clrMapOvr>
+    <a:masterClrMapping/>
+  </p:clrMapOvr>
+</p:sld>
+</file>
+
+<file path=ppt/slides/slide20.xml><?xml version="1.0" encoding="utf-8"?>
+<p:sld xmlns:a="http://schemas.openxmlformats.org/drawingml/2006/main" xmlns:r="http://schemas.openxmlformats.org/officeDocument/2006/relationships" xmlns:p="http://schemas.openxmlformats.org/presentationml/2006/main">
+  <p:cSld>
+    <p:spTree>
+      <p:nvGrpSpPr>
+        <p:cNvPr id="1" name=""/>
+        <p:cNvGrpSpPr/>
+        <p:nvPr/>
+      </p:nvGrpSpPr>
+      <p:grpSpPr>
+        <a:xfrm>
+          <a:off x="0" y="0"/>
+          <a:ext cx="0" cy="0"/>
+          <a:chOff x="0" y="0"/>
+          <a:chExt cx="0" cy="0"/>
+        </a:xfrm>
+      </p:grpSpPr>
+      <p:sp>
+        <p:nvSpPr>
+          <p:cNvPr id="10" name="Rectangle 9">
+            <a:extLst>
+              <a:ext uri="{FF2B5EF4-FFF2-40B4-BE49-F238E27FC236}">
+                <a16:creationId xmlns:a16="http://schemas.microsoft.com/office/drawing/2014/main" id="{9F0C2FE5-058E-4C07-89EA-CB4C7C754C5F}"/>
+              </a:ext>
+            </a:extLst>
+          </p:cNvPr>
+          <p:cNvSpPr/>
+          <p:nvPr/>
+        </p:nvSpPr>
+        <p:spPr>
+          <a:xfrm>
+            <a:off x="9950828" y="1161825"/>
+            <a:ext cx="1904103" cy="4733365"/>
+          </a:xfrm>
+          <a:prstGeom prst="rect">
+            <a:avLst/>
+          </a:prstGeom>
+          <a:noFill/>
+        </p:spPr>
+        <p:style>
+          <a:lnRef idx="2">
+            <a:schemeClr val="accent1">
+              <a:shade val="50000"/>
+            </a:schemeClr>
+          </a:lnRef>
+          <a:fillRef idx="1">
+            <a:schemeClr val="accent1"/>
+          </a:fillRef>
+          <a:effectRef idx="0">
+            <a:schemeClr val="accent1"/>
+          </a:effectRef>
+          <a:fontRef idx="minor">
+            <a:schemeClr val="lt1"/>
+          </a:fontRef>
+        </p:style>
+        <p:txBody>
+          <a:bodyPr rtlCol="0" anchor="ctr"/>
+          <a:lstStyle/>
+          <a:p>
+            <a:pPr algn="ctr"/>
+            <a:endParaRPr lang="en-US" dirty="0"/>
+          </a:p>
+          <a:p>
+            <a:pPr algn="ctr"/>
+            <a:endParaRPr lang="en-US" dirty="0"/>
+          </a:p>
+          <a:p>
+            <a:r>
+              <a:rPr lang="en-US" dirty="0"/>
+              <a:t>2012 list –</a:t>
+            </a:r>
+          </a:p>
+          <a:p>
+            <a:r>
+              <a:rPr lang="en-US" sz="1600" dirty="0"/>
+              <a:t>companies that are in 11-15 years group and still in the list, we can notice, high growth rates. For in 6-10 years group, growth rates are even higher, but volatile</a:t>
+            </a:r>
+          </a:p>
+          <a:p>
+            <a:endParaRPr lang="en-US" sz="1600" dirty="0"/>
+          </a:p>
+          <a:p>
+            <a:r>
+              <a:rPr lang="en-US" sz="1200" dirty="0"/>
+              <a:t>Note that, there was "Great Recession of 2008" during this time.</a:t>
+            </a:r>
+            <a:endParaRPr lang="en-US" sz="1400" dirty="0"/>
+          </a:p>
+        </p:txBody>
+      </p:sp>
+      <p:pic>
+        <p:nvPicPr>
+          <p:cNvPr id="6" name="Picture 5">
+            <a:extLst>
+              <a:ext uri="{FF2B5EF4-FFF2-40B4-BE49-F238E27FC236}">
+                <a16:creationId xmlns:a16="http://schemas.microsoft.com/office/drawing/2014/main" id="{1CA88DBA-3856-4C8D-A965-8762C4F80D02}"/>
+              </a:ext>
+            </a:extLst>
+          </p:cNvPr>
+          <p:cNvPicPr>
+            <a:picLocks noChangeAspect="1"/>
+          </p:cNvPicPr>
+          <p:nvPr/>
+        </p:nvPicPr>
+        <p:blipFill>
+          <a:blip r:embed="rId2"/>
+          <a:stretch>
+            <a:fillRect/>
+          </a:stretch>
+        </p:blipFill>
+        <p:spPr>
+          <a:xfrm>
+            <a:off x="0" y="0"/>
+            <a:ext cx="4846196" cy="6858000"/>
+          </a:xfrm>
+          <a:prstGeom prst="rect">
+            <a:avLst/>
+          </a:prstGeom>
+        </p:spPr>
+      </p:pic>
+      <p:pic>
+        <p:nvPicPr>
+          <p:cNvPr id="9" name="Picture 8">
+            <a:extLst>
+              <a:ext uri="{FF2B5EF4-FFF2-40B4-BE49-F238E27FC236}">
+                <a16:creationId xmlns:a16="http://schemas.microsoft.com/office/drawing/2014/main" id="{8A87AC63-6129-4E1B-9E3A-E2369E6B0049}"/>
+              </a:ext>
+            </a:extLst>
+          </p:cNvPr>
+          <p:cNvPicPr>
+            <a:picLocks noChangeAspect="1"/>
+          </p:cNvPicPr>
+          <p:nvPr/>
+        </p:nvPicPr>
+        <p:blipFill>
+          <a:blip r:embed="rId3"/>
+          <a:stretch>
+            <a:fillRect/>
+          </a:stretch>
+        </p:blipFill>
+        <p:spPr>
+          <a:xfrm>
+            <a:off x="4846196" y="0"/>
+            <a:ext cx="5025540" cy="6858000"/>
+          </a:xfrm>
+          <a:prstGeom prst="rect">
+            <a:avLst/>
+          </a:prstGeom>
+        </p:spPr>
+      </p:pic>
+    </p:spTree>
+    <p:extLst>
+      <p:ext uri="{BB962C8B-B14F-4D97-AF65-F5344CB8AC3E}">
+        <p14:creationId xmlns:p14="http://schemas.microsoft.com/office/powerpoint/2010/main" val="331839530"/>
+      </p:ext>
+    </p:extLst>
+  </p:cSld>
+  <p:clrMapOvr>
+    <a:masterClrMapping/>
+  </p:clrMapOvr>
+</p:sld>
+</file>
+
+<file path=ppt/slides/slide21.xml><?xml version="1.0" encoding="utf-8"?>
+<p:sld xmlns:a="http://schemas.openxmlformats.org/drawingml/2006/main" xmlns:r="http://schemas.openxmlformats.org/officeDocument/2006/relationships" xmlns:p="http://schemas.openxmlformats.org/presentationml/2006/main">
+  <p:cSld>
+    <p:spTree>
+      <p:nvGrpSpPr>
+        <p:cNvPr id="1" name=""/>
+        <p:cNvGrpSpPr/>
+        <p:nvPr/>
+      </p:nvGrpSpPr>
+      <p:grpSpPr>
+        <a:xfrm>
+          <a:off x="0" y="0"/>
+          <a:ext cx="0" cy="0"/>
+          <a:chOff x="0" y="0"/>
+          <a:chExt cx="0" cy="0"/>
+        </a:xfrm>
+      </p:grpSpPr>
+      <p:sp>
+        <p:nvSpPr>
+          <p:cNvPr id="10" name="Rectangle 9">
+            <a:extLst>
+              <a:ext uri="{FF2B5EF4-FFF2-40B4-BE49-F238E27FC236}">
+                <a16:creationId xmlns:a16="http://schemas.microsoft.com/office/drawing/2014/main" id="{9F0C2FE5-058E-4C07-89EA-CB4C7C754C5F}"/>
+              </a:ext>
+            </a:extLst>
+          </p:cNvPr>
+          <p:cNvSpPr/>
+          <p:nvPr/>
+        </p:nvSpPr>
+        <p:spPr>
+          <a:xfrm>
+            <a:off x="9950828" y="1161825"/>
+            <a:ext cx="1904103" cy="4733365"/>
+          </a:xfrm>
+          <a:prstGeom prst="rect">
+            <a:avLst/>
+          </a:prstGeom>
+          <a:noFill/>
+        </p:spPr>
+        <p:style>
+          <a:lnRef idx="2">
+            <a:schemeClr val="accent1">
+              <a:shade val="50000"/>
+            </a:schemeClr>
+          </a:lnRef>
+          <a:fillRef idx="1">
+            <a:schemeClr val="accent1"/>
+          </a:fillRef>
+          <a:effectRef idx="0">
+            <a:schemeClr val="accent1"/>
+          </a:effectRef>
+          <a:fontRef idx="minor">
+            <a:schemeClr val="lt1"/>
+          </a:fontRef>
+        </p:style>
+        <p:txBody>
+          <a:bodyPr rtlCol="0" anchor="ctr"/>
+          <a:lstStyle/>
+          <a:p>
+            <a:pPr algn="ctr"/>
+            <a:endParaRPr lang="en-US" dirty="0"/>
+          </a:p>
+          <a:p>
+            <a:pPr algn="ctr"/>
+            <a:endParaRPr lang="en-US" dirty="0"/>
+          </a:p>
+          <a:p>
+            <a:r>
+              <a:rPr lang="en-US" sz="1600" dirty="0"/>
+              <a:t>Picked two years 1995 and 1985 and all the companies that are in the list that year and also hit 15 years overall </a:t>
+            </a:r>
+          </a:p>
+        </p:txBody>
+      </p:sp>
+      <p:pic>
+        <p:nvPicPr>
+          <p:cNvPr id="3" name="Picture 2">
+            <a:extLst>
+              <a:ext uri="{FF2B5EF4-FFF2-40B4-BE49-F238E27FC236}">
+                <a16:creationId xmlns:a16="http://schemas.microsoft.com/office/drawing/2014/main" id="{C1393BDF-34E7-411C-9947-43370AFC1ECF}"/>
+              </a:ext>
+            </a:extLst>
+          </p:cNvPr>
+          <p:cNvPicPr>
+            <a:picLocks noChangeAspect="1"/>
+          </p:cNvPicPr>
+          <p:nvPr/>
+        </p:nvPicPr>
+        <p:blipFill>
+          <a:blip r:embed="rId2"/>
+          <a:stretch>
+            <a:fillRect/>
+          </a:stretch>
+        </p:blipFill>
+        <p:spPr>
+          <a:xfrm>
+            <a:off x="49423" y="234222"/>
+            <a:ext cx="4605981" cy="3194778"/>
+          </a:xfrm>
+          <a:prstGeom prst="rect">
+            <a:avLst/>
+          </a:prstGeom>
+        </p:spPr>
+      </p:pic>
+      <p:pic>
+        <p:nvPicPr>
+          <p:cNvPr id="5" name="Picture 4">
+            <a:extLst>
+              <a:ext uri="{FF2B5EF4-FFF2-40B4-BE49-F238E27FC236}">
+                <a16:creationId xmlns:a16="http://schemas.microsoft.com/office/drawing/2014/main" id="{ACBA3FF6-1D4A-4FDA-89F7-B80988788C1E}"/>
+              </a:ext>
+            </a:extLst>
+          </p:cNvPr>
+          <p:cNvPicPr>
+            <a:picLocks noChangeAspect="1"/>
+          </p:cNvPicPr>
+          <p:nvPr/>
+        </p:nvPicPr>
+        <p:blipFill>
+          <a:blip r:embed="rId3"/>
+          <a:stretch>
+            <a:fillRect/>
+          </a:stretch>
+        </p:blipFill>
+        <p:spPr>
+          <a:xfrm>
+            <a:off x="49424" y="3429001"/>
+            <a:ext cx="4608638" cy="3194778"/>
+          </a:xfrm>
+          <a:prstGeom prst="rect">
+            <a:avLst/>
+          </a:prstGeom>
+        </p:spPr>
+      </p:pic>
+      <p:pic>
+        <p:nvPicPr>
+          <p:cNvPr id="8" name="Picture 7">
+            <a:extLst>
+              <a:ext uri="{FF2B5EF4-FFF2-40B4-BE49-F238E27FC236}">
+                <a16:creationId xmlns:a16="http://schemas.microsoft.com/office/drawing/2014/main" id="{75B9B6EA-16DE-491D-BD8B-D8C0467BF153}"/>
+              </a:ext>
+            </a:extLst>
+          </p:cNvPr>
+          <p:cNvPicPr>
+            <a:picLocks noChangeAspect="1"/>
+          </p:cNvPicPr>
+          <p:nvPr/>
+        </p:nvPicPr>
+        <p:blipFill>
+          <a:blip r:embed="rId4"/>
+          <a:stretch>
+            <a:fillRect/>
+          </a:stretch>
+        </p:blipFill>
+        <p:spPr>
+          <a:xfrm>
+            <a:off x="4655404" y="234221"/>
+            <a:ext cx="5144812" cy="3170929"/>
+          </a:xfrm>
+          <a:prstGeom prst="rect">
+            <a:avLst/>
+          </a:prstGeom>
+        </p:spPr>
+      </p:pic>
+      <p:pic>
+        <p:nvPicPr>
+          <p:cNvPr id="12" name="Picture 11">
+            <a:extLst>
+              <a:ext uri="{FF2B5EF4-FFF2-40B4-BE49-F238E27FC236}">
+                <a16:creationId xmlns:a16="http://schemas.microsoft.com/office/drawing/2014/main" id="{C694B6F4-A2B4-4EEC-965B-90B6C8549119}"/>
+              </a:ext>
+            </a:extLst>
+          </p:cNvPr>
+          <p:cNvPicPr>
+            <a:picLocks noChangeAspect="1"/>
+          </p:cNvPicPr>
+          <p:nvPr/>
+        </p:nvPicPr>
+        <p:blipFill>
+          <a:blip r:embed="rId5"/>
+          <a:stretch>
+            <a:fillRect/>
+          </a:stretch>
+        </p:blipFill>
+        <p:spPr>
+          <a:xfrm>
+            <a:off x="4655405" y="3405150"/>
+            <a:ext cx="5144812" cy="3218628"/>
+          </a:xfrm>
+          <a:prstGeom prst="rect">
+            <a:avLst/>
+          </a:prstGeom>
+        </p:spPr>
+      </p:pic>
+    </p:spTree>
+    <p:extLst>
+      <p:ext uri="{BB962C8B-B14F-4D97-AF65-F5344CB8AC3E}">
+        <p14:creationId xmlns:p14="http://schemas.microsoft.com/office/powerpoint/2010/main" val="1489477064"/>
+      </p:ext>
+    </p:extLst>
+  </p:cSld>
+  <p:clrMapOvr>
+    <a:masterClrMapping/>
+  </p:clrMapOvr>
+</p:sld>
+</file>
+
+<file path=ppt/slides/slide22.xml><?xml version="1.0" encoding="utf-8"?>
+<p:sld xmlns:a="http://schemas.openxmlformats.org/drawingml/2006/main" xmlns:r="http://schemas.openxmlformats.org/officeDocument/2006/relationships" xmlns:p="http://schemas.openxmlformats.org/presentationml/2006/main">
+  <p:cSld>
+    <p:spTree>
+      <p:nvGrpSpPr>
+        <p:cNvPr id="1" name=""/>
+        <p:cNvGrpSpPr/>
+        <p:nvPr/>
+      </p:nvGrpSpPr>
+      <p:grpSpPr>
+        <a:xfrm>
+          <a:off x="0" y="0"/>
+          <a:ext cx="0" cy="0"/>
+          <a:chOff x="0" y="0"/>
+          <a:chExt cx="0" cy="0"/>
+        </a:xfrm>
+      </p:grpSpPr>
+      <p:sp>
+        <p:nvSpPr>
+          <p:cNvPr id="2" name="Title 1">
+            <a:extLst>
+              <a:ext uri="{FF2B5EF4-FFF2-40B4-BE49-F238E27FC236}">
+                <a16:creationId xmlns:a16="http://schemas.microsoft.com/office/drawing/2014/main" id="{FED3EF28-EB57-4BE3-B309-B4B12A1738ED}"/>
+              </a:ext>
+            </a:extLst>
+          </p:cNvPr>
+          <p:cNvSpPr>
+            <a:spLocks noGrp="1"/>
+          </p:cNvSpPr>
+          <p:nvPr>
+            <p:ph type="title"/>
+          </p:nvPr>
+        </p:nvSpPr>
+        <p:spPr/>
+        <p:txBody>
+          <a:bodyPr/>
+          <a:lstStyle/>
+          <a:p>
+            <a:r>
+              <a:rPr lang="en-US" dirty="0"/>
+              <a:t>Conclusion</a:t>
+            </a:r>
+          </a:p>
+        </p:txBody>
+      </p:sp>
+      <p:sp>
+        <p:nvSpPr>
+          <p:cNvPr id="3" name="Content Placeholder 2">
+            <a:extLst>
+              <a:ext uri="{FF2B5EF4-FFF2-40B4-BE49-F238E27FC236}">
+                <a16:creationId xmlns:a16="http://schemas.microsoft.com/office/drawing/2014/main" id="{02C6B7F9-2D1B-4B38-B778-50EB2D886AA7}"/>
+              </a:ext>
+            </a:extLst>
+          </p:cNvPr>
+          <p:cNvSpPr>
+            <a:spLocks noGrp="1"/>
+          </p:cNvSpPr>
+          <p:nvPr>
+            <p:ph idx="1"/>
+          </p:nvPr>
+        </p:nvSpPr>
+        <p:spPr/>
+        <p:txBody>
+          <a:bodyPr/>
+          <a:lstStyle/>
+          <a:p>
+            <a:r>
+              <a:rPr lang="en-US" dirty="0">
+                <a:solidFill>
+                  <a:srgbClr val="92D050"/>
+                </a:solidFill>
+              </a:rPr>
+              <a:t>There is lot of growth left in companies after being added to Fortune 500 list</a:t>
+            </a:r>
+          </a:p>
+          <a:p>
+            <a:r>
+              <a:rPr lang="en-US" dirty="0">
+                <a:solidFill>
+                  <a:srgbClr val="92D050"/>
+                </a:solidFill>
+              </a:rPr>
+              <a:t>Companies added newly or in recent years is a good started list for further research</a:t>
+            </a:r>
+          </a:p>
+          <a:p>
+            <a:r>
+              <a:rPr lang="en-US" dirty="0">
+                <a:solidFill>
+                  <a:srgbClr val="92D050"/>
+                </a:solidFill>
+              </a:rPr>
+              <a:t>Be aware of the high churn in early years </a:t>
+            </a:r>
+          </a:p>
+          <a:p>
+            <a:r>
+              <a:rPr lang="en-US" dirty="0">
+                <a:solidFill>
+                  <a:srgbClr val="92D050"/>
+                </a:solidFill>
+              </a:rPr>
+              <a:t>Other than this, there are no </a:t>
+            </a:r>
+            <a:r>
+              <a:rPr lang="en-US">
+                <a:solidFill>
+                  <a:srgbClr val="92D050"/>
+                </a:solidFill>
+              </a:rPr>
+              <a:t>other definitive </a:t>
+            </a:r>
+            <a:r>
+              <a:rPr lang="en-US" dirty="0">
+                <a:solidFill>
+                  <a:srgbClr val="92D050"/>
+                </a:solidFill>
+              </a:rPr>
+              <a:t>conclusions to be drawn</a:t>
+            </a:r>
+          </a:p>
+          <a:p>
+            <a:endParaRPr lang="en-US" dirty="0">
+              <a:solidFill>
+                <a:srgbClr val="92D050"/>
+              </a:solidFill>
+            </a:endParaRPr>
+          </a:p>
+        </p:txBody>
+      </p:sp>
+    </p:spTree>
+    <p:extLst>
+      <p:ext uri="{BB962C8B-B14F-4D97-AF65-F5344CB8AC3E}">
+        <p14:creationId xmlns:p14="http://schemas.microsoft.com/office/powerpoint/2010/main" val="4264621472"/>
+      </p:ext>
+    </p:extLst>
+  </p:cSld>
+  <p:clrMapOvr>
+    <a:masterClrMapping/>
+  </p:clrMapOvr>
+</p:sld>
+</file>
+
+<file path=ppt/slides/slide23.xml><?xml version="1.0" encoding="utf-8"?>
+<p:sld xmlns:a="http://schemas.openxmlformats.org/drawingml/2006/main" xmlns:r="http://schemas.openxmlformats.org/officeDocument/2006/relationships" xmlns:p="http://schemas.openxmlformats.org/presentationml/2006/main">
+  <p:cSld>
+    <p:spTree>
+      <p:nvGrpSpPr>
+        <p:cNvPr id="1" name=""/>
+        <p:cNvGrpSpPr/>
+        <p:nvPr/>
+      </p:nvGrpSpPr>
+      <p:grpSpPr>
+        <a:xfrm>
+          <a:off x="0" y="0"/>
+          <a:ext cx="0" cy="0"/>
+          <a:chOff x="0" y="0"/>
+          <a:chExt cx="0" cy="0"/>
+        </a:xfrm>
+      </p:grpSpPr>
+      <p:sp>
+        <p:nvSpPr>
+          <p:cNvPr id="2" name="Title 1">
+            <a:extLst>
+              <a:ext uri="{FF2B5EF4-FFF2-40B4-BE49-F238E27FC236}">
+                <a16:creationId xmlns:a16="http://schemas.microsoft.com/office/drawing/2014/main" id="{FED3EF28-EB57-4BE3-B309-B4B12A1738ED}"/>
+              </a:ext>
+            </a:extLst>
+          </p:cNvPr>
+          <p:cNvSpPr>
+            <a:spLocks noGrp="1"/>
+          </p:cNvSpPr>
+          <p:nvPr>
+            <p:ph type="title"/>
+          </p:nvPr>
+        </p:nvSpPr>
+        <p:spPr/>
+        <p:txBody>
+          <a:bodyPr/>
+          <a:lstStyle/>
+          <a:p>
+            <a:r>
+              <a:rPr lang="en-US" dirty="0"/>
+              <a:t>Future Work</a:t>
+            </a:r>
+          </a:p>
+        </p:txBody>
+      </p:sp>
+      <p:sp>
+        <p:nvSpPr>
+          <p:cNvPr id="3" name="Content Placeholder 2">
+            <a:extLst>
+              <a:ext uri="{FF2B5EF4-FFF2-40B4-BE49-F238E27FC236}">
+                <a16:creationId xmlns:a16="http://schemas.microsoft.com/office/drawing/2014/main" id="{02C6B7F9-2D1B-4B38-B778-50EB2D886AA7}"/>
+              </a:ext>
+            </a:extLst>
+          </p:cNvPr>
+          <p:cNvSpPr>
+            <a:spLocks noGrp="1"/>
+          </p:cNvSpPr>
+          <p:nvPr>
+            <p:ph idx="1"/>
+          </p:nvPr>
+        </p:nvSpPr>
+        <p:spPr/>
+        <p:txBody>
+          <a:bodyPr/>
+          <a:lstStyle/>
+          <a:p>
+            <a:r>
+              <a:rPr lang="en-US" dirty="0">
+                <a:solidFill>
+                  <a:srgbClr val="92D050"/>
+                </a:solidFill>
+              </a:rPr>
+              <a:t>Analysis using more parameters </a:t>
+            </a:r>
+          </a:p>
+          <a:p>
+            <a:r>
+              <a:rPr lang="en-US" dirty="0">
+                <a:solidFill>
+                  <a:srgbClr val="92D050"/>
+                </a:solidFill>
+              </a:rPr>
+              <a:t>Better trendlines in charts</a:t>
+            </a:r>
+          </a:p>
+          <a:p>
+            <a:r>
+              <a:rPr lang="en-US" dirty="0">
+                <a:solidFill>
+                  <a:srgbClr val="92D050"/>
+                </a:solidFill>
+              </a:rPr>
+              <a:t>Scraping with database as backend</a:t>
+            </a:r>
+          </a:p>
+        </p:txBody>
+      </p:sp>
+    </p:spTree>
+    <p:extLst>
+      <p:ext uri="{BB962C8B-B14F-4D97-AF65-F5344CB8AC3E}">
+        <p14:creationId xmlns:p14="http://schemas.microsoft.com/office/powerpoint/2010/main" val="2637711527"/>
+      </p:ext>
+    </p:extLst>
+  </p:cSld>
+  <p:clrMapOvr>
+    <a:masterClrMapping/>
+  </p:clrMapOvr>
+</p:sld>
+</file>
+
+<file path=ppt/slides/slide24.xml><?xml version="1.0" encoding="utf-8"?>
+<p:sld xmlns:a="http://schemas.openxmlformats.org/drawingml/2006/main" xmlns:r="http://schemas.openxmlformats.org/officeDocument/2006/relationships" xmlns:p="http://schemas.openxmlformats.org/presentationml/2006/main">
+  <p:cSld>
+    <p:spTree>
+      <p:nvGrpSpPr>
+        <p:cNvPr id="1" name=""/>
+        <p:cNvGrpSpPr/>
+        <p:nvPr/>
+      </p:nvGrpSpPr>
+      <p:grpSpPr>
+        <a:xfrm>
+          <a:off x="0" y="0"/>
+          <a:ext cx="0" cy="0"/>
+          <a:chOff x="0" y="0"/>
+          <a:chExt cx="0" cy="0"/>
+        </a:xfrm>
+      </p:grpSpPr>
+      <p:sp>
+        <p:nvSpPr>
+          <p:cNvPr id="2" name="Title 1">
+            <a:extLst>
+              <a:ext uri="{FF2B5EF4-FFF2-40B4-BE49-F238E27FC236}">
+                <a16:creationId xmlns:a16="http://schemas.microsoft.com/office/drawing/2014/main" id="{FED3EF28-EB57-4BE3-B309-B4B12A1738ED}"/>
+              </a:ext>
+            </a:extLst>
+          </p:cNvPr>
+          <p:cNvSpPr>
+            <a:spLocks noGrp="1"/>
+          </p:cNvSpPr>
+          <p:nvPr>
+            <p:ph type="title"/>
+          </p:nvPr>
+        </p:nvSpPr>
+        <p:spPr/>
+        <p:txBody>
+          <a:bodyPr/>
+          <a:lstStyle/>
+          <a:p>
+            <a:r>
+              <a:rPr lang="en-US" dirty="0"/>
+              <a:t>Links</a:t>
+            </a:r>
+          </a:p>
+        </p:txBody>
+      </p:sp>
+      <p:sp>
+        <p:nvSpPr>
+          <p:cNvPr id="3" name="Content Placeholder 2">
+            <a:extLst>
+              <a:ext uri="{FF2B5EF4-FFF2-40B4-BE49-F238E27FC236}">
+                <a16:creationId xmlns:a16="http://schemas.microsoft.com/office/drawing/2014/main" id="{02C6B7F9-2D1B-4B38-B778-50EB2D886AA7}"/>
+              </a:ext>
+            </a:extLst>
+          </p:cNvPr>
+          <p:cNvSpPr>
+            <a:spLocks noGrp="1"/>
+          </p:cNvSpPr>
+          <p:nvPr>
+            <p:ph idx="1"/>
+          </p:nvPr>
+        </p:nvSpPr>
+        <p:spPr/>
+        <p:txBody>
+          <a:bodyPr/>
+          <a:lstStyle/>
+          <a:p>
+            <a:r>
+              <a:rPr lang="en-US" dirty="0">
+                <a:solidFill>
+                  <a:srgbClr val="92D050"/>
+                </a:solidFill>
+              </a:rPr>
+              <a:t>Github : </a:t>
+            </a:r>
+            <a:r>
+              <a:rPr lang="en-US" dirty="0">
+                <a:hlinkClick r:id="rId2"/>
+              </a:rPr>
+              <a:t>https://github.com/radhavrmk/WebScrapeProject.git</a:t>
+            </a:r>
+            <a:endParaRPr lang="en-US" dirty="0"/>
+          </a:p>
+          <a:p>
+            <a:r>
+              <a:rPr lang="en-US">
+                <a:solidFill>
+                  <a:srgbClr val="92D050"/>
+                </a:solidFill>
+              </a:rPr>
+              <a:t>Data : http://archive.fortune.com/magazines/fortune/fortune500_archive/full/2000/</a:t>
+            </a:r>
+            <a:endParaRPr lang="en-US" dirty="0">
+              <a:solidFill>
+                <a:srgbClr val="92D050"/>
+              </a:solidFill>
+            </a:endParaRPr>
+          </a:p>
+        </p:txBody>
+      </p:sp>
+    </p:spTree>
+    <p:extLst>
+      <p:ext uri="{BB962C8B-B14F-4D97-AF65-F5344CB8AC3E}">
+        <p14:creationId xmlns:p14="http://schemas.microsoft.com/office/powerpoint/2010/main" val="2791947660"/>
       </p:ext>
     </p:extLst>
   </p:cSld>
@@ -7304,38 +8310,8 @@
           <a:p>
             <a:r>
               <a:rPr lang="en-US" dirty="0"/>
-              <a:t>Scraping using </a:t>
-            </a:r>
-            <a:r>
-              <a:rPr lang="en-US" dirty="0" err="1"/>
-              <a:t>Scrapy</a:t>
-            </a:r>
-            <a:endParaRPr lang="en-US" dirty="0"/>
-          </a:p>
-        </p:txBody>
-      </p:sp>
-      <p:sp>
-        <p:nvSpPr>
-          <p:cNvPr id="3" name="Text Placeholder 2">
-            <a:extLst>
-              <a:ext uri="{FF2B5EF4-FFF2-40B4-BE49-F238E27FC236}">
-                <a16:creationId xmlns:a16="http://schemas.microsoft.com/office/drawing/2014/main" id="{21724565-99B7-4B8E-A386-72C5FC05525A}"/>
-              </a:ext>
-            </a:extLst>
-          </p:cNvPr>
-          <p:cNvSpPr>
-            <a:spLocks noGrp="1"/>
-          </p:cNvSpPr>
-          <p:nvPr>
-            <p:ph type="body" idx="1"/>
-          </p:nvPr>
-        </p:nvSpPr>
-        <p:spPr/>
-        <p:txBody>
-          <a:bodyPr/>
-          <a:lstStyle/>
-          <a:p>
-            <a:endParaRPr lang="en-US"/>
+              <a:t>Scraping using Scrapy</a:t>
+            </a:r>
           </a:p>
         </p:txBody>
       </p:sp>
@@ -7454,23 +8430,7 @@
                   <a:srgbClr val="92D050"/>
                 </a:solidFill>
               </a:rPr>
-              <a:t>3 different HTML/</a:t>
-            </a:r>
-            <a:r>
-              <a:rPr lang="en-US" sz="3200" dirty="0" err="1">
-                <a:solidFill>
-                  <a:srgbClr val="92D050"/>
-                </a:solidFill>
-              </a:rPr>
-              <a:t>css</a:t>
-            </a:r>
-            <a:r>
-              <a:rPr lang="en-US" sz="3200" dirty="0">
-                <a:solidFill>
-                  <a:srgbClr val="92D050"/>
-                </a:solidFill>
-              </a:rPr>
-              <a:t> formats </a:t>
+              <a:t>3 different HTML/CSS formats </a:t>
             </a:r>
           </a:p>
           <a:p>
@@ -7551,13 +8511,8 @@
           <a:p>
             <a:r>
               <a:rPr lang="en-US" dirty="0"/>
-              <a:t>What I Tried with </a:t>
-            </a:r>
-            <a:r>
-              <a:rPr lang="en-US" dirty="0" err="1"/>
-              <a:t>Scrapy</a:t>
-            </a:r>
-            <a:endParaRPr lang="en-US" dirty="0"/>
+              <a:t>What I Tried with Scrapy</a:t>
+            </a:r>
           </a:p>
         </p:txBody>
       </p:sp>
@@ -7678,31 +8633,6 @@
           </a:p>
         </p:txBody>
       </p:sp>
-      <p:sp>
-        <p:nvSpPr>
-          <p:cNvPr id="3" name="Text Placeholder 2">
-            <a:extLst>
-              <a:ext uri="{FF2B5EF4-FFF2-40B4-BE49-F238E27FC236}">
-                <a16:creationId xmlns:a16="http://schemas.microsoft.com/office/drawing/2014/main" id="{21724565-99B7-4B8E-A386-72C5FC05525A}"/>
-              </a:ext>
-            </a:extLst>
-          </p:cNvPr>
-          <p:cNvSpPr>
-            <a:spLocks noGrp="1"/>
-          </p:cNvSpPr>
-          <p:nvPr>
-            <p:ph type="body" idx="1"/>
-          </p:nvPr>
-        </p:nvSpPr>
-        <p:spPr/>
-        <p:txBody>
-          <a:bodyPr/>
-          <a:lstStyle/>
-          <a:p>
-            <a:endParaRPr lang="en-US"/>
-          </a:p>
-        </p:txBody>
-      </p:sp>
     </p:spTree>
     <p:extLst>
       <p:ext uri="{BB962C8B-B14F-4D97-AF65-F5344CB8AC3E}">
@@ -7862,89 +8792,99 @@
           <a:chExt cx="0" cy="0"/>
         </a:xfrm>
       </p:grpSpPr>
-      <p:pic>
-        <p:nvPicPr>
-          <p:cNvPr id="7" name="Content Placeholder 6">
+      <p:sp>
+        <p:nvSpPr>
+          <p:cNvPr id="2" name="Title 1">
             <a:extLst>
               <a:ext uri="{FF2B5EF4-FFF2-40B4-BE49-F238E27FC236}">
-                <a16:creationId xmlns:a16="http://schemas.microsoft.com/office/drawing/2014/main" id="{0E4529A5-E65F-404F-AF0D-7B17543000B2}"/>
+                <a16:creationId xmlns:a16="http://schemas.microsoft.com/office/drawing/2014/main" id="{FED3EF28-EB57-4BE3-B309-B4B12A1738ED}"/>
               </a:ext>
             </a:extLst>
           </p:cNvPr>
-          <p:cNvPicPr>
-            <a:picLocks noGrp="1" noChangeAspect="1"/>
-          </p:cNvPicPr>
-          <p:nvPr>
-            <p:ph idx="1"/>
-          </p:nvPr>
-        </p:nvPicPr>
-        <p:blipFill>
-          <a:blip r:embed="rId2"/>
-          <a:stretch>
-            <a:fillRect/>
-          </a:stretch>
-        </p:blipFill>
-        <p:spPr>
-          <a:xfrm>
-            <a:off x="3361960" y="298084"/>
-            <a:ext cx="3973023" cy="6261831"/>
-          </a:xfrm>
-        </p:spPr>
-      </p:pic>
-      <p:sp>
-        <p:nvSpPr>
-          <p:cNvPr id="10" name="Rectangle 9">
+          <p:cNvSpPr>
+            <a:spLocks noGrp="1"/>
+          </p:cNvSpPr>
+          <p:nvPr>
+            <p:ph type="title"/>
+          </p:nvPr>
+        </p:nvSpPr>
+        <p:spPr/>
+        <p:txBody>
+          <a:bodyPr/>
+          <a:lstStyle/>
+          <a:p>
+            <a:r>
+              <a:rPr lang="en-US" dirty="0"/>
+              <a:t>Word of Caution</a:t>
+            </a:r>
+          </a:p>
+        </p:txBody>
+      </p:sp>
+      <p:sp>
+        <p:nvSpPr>
+          <p:cNvPr id="3" name="Content Placeholder 2">
             <a:extLst>
               <a:ext uri="{FF2B5EF4-FFF2-40B4-BE49-F238E27FC236}">
-                <a16:creationId xmlns:a16="http://schemas.microsoft.com/office/drawing/2014/main" id="{9F0C2FE5-058E-4C07-89EA-CB4C7C754C5F}"/>
+                <a16:creationId xmlns:a16="http://schemas.microsoft.com/office/drawing/2014/main" id="{02C6B7F9-2D1B-4B38-B778-50EB2D886AA7}"/>
               </a:ext>
             </a:extLst>
           </p:cNvPr>
-          <p:cNvSpPr/>
-          <p:nvPr/>
-        </p:nvSpPr>
-        <p:spPr>
-          <a:xfrm>
-            <a:off x="9832490" y="1161825"/>
-            <a:ext cx="1904103" cy="4733365"/>
-          </a:xfrm>
-          <a:prstGeom prst="rect">
-            <a:avLst/>
-          </a:prstGeom>
-          <a:noFill/>
-        </p:spPr>
-        <p:style>
-          <a:lnRef idx="2">
-            <a:schemeClr val="accent1">
-              <a:shade val="50000"/>
-            </a:schemeClr>
-          </a:lnRef>
-          <a:fillRef idx="1">
-            <a:schemeClr val="accent1"/>
-          </a:fillRef>
-          <a:effectRef idx="0">
-            <a:schemeClr val="accent1"/>
-          </a:effectRef>
-          <a:fontRef idx="minor">
-            <a:schemeClr val="lt1"/>
-          </a:fontRef>
-        </p:style>
-        <p:txBody>
-          <a:bodyPr rtlCol="0" anchor="ctr"/>
-          <a:lstStyle/>
-          <a:p>
-            <a:pPr algn="ctr"/>
-            <a:r>
-              <a:rPr lang="en-US" dirty="0"/>
-              <a:t>A quick look at what made the top 20 in 2012</a:t>
-            </a:r>
+          <p:cNvSpPr>
+            <a:spLocks noGrp="1"/>
+          </p:cNvSpPr>
+          <p:nvPr>
+            <p:ph idx="1"/>
+          </p:nvPr>
+        </p:nvSpPr>
+        <p:spPr/>
+        <p:txBody>
+          <a:bodyPr>
+            <a:normAutofit/>
+          </a:bodyPr>
+          <a:lstStyle/>
+          <a:p>
+            <a:r>
+              <a:rPr lang="en-US" sz="3200" dirty="0">
+                <a:solidFill>
+                  <a:srgbClr val="92D050"/>
+                </a:solidFill>
+              </a:rPr>
+              <a:t>Limited nature of analysis using only two parameters revenue and profits</a:t>
+            </a:r>
+          </a:p>
+          <a:p>
+            <a:r>
+              <a:rPr lang="en-US" sz="3200" dirty="0">
+                <a:solidFill>
+                  <a:srgbClr val="92D050"/>
+                </a:solidFill>
+              </a:rPr>
+              <a:t>Great Recession of 2008 skews trends for recent years</a:t>
+            </a:r>
+          </a:p>
+          <a:p>
+            <a:r>
+              <a:rPr lang="en-US" sz="3200" dirty="0">
+                <a:solidFill>
+                  <a:srgbClr val="92D050"/>
+                </a:solidFill>
+              </a:rPr>
+              <a:t>You will be sick of line plots by the end of this presentation</a:t>
+            </a:r>
+          </a:p>
+          <a:p>
+            <a:endParaRPr lang="en-US" sz="3200" dirty="0">
+              <a:solidFill>
+                <a:srgbClr val="92D050"/>
+              </a:solidFill>
+            </a:endParaRPr>
           </a:p>
         </p:txBody>
       </p:sp>
     </p:spTree>
     <p:extLst>
       <p:ext uri="{BB962C8B-B14F-4D97-AF65-F5344CB8AC3E}">
-        <p14:creationId xmlns:p14="http://schemas.microsoft.com/office/powerpoint/2010/main" val="1890540436"/>
+        <p14:creationId xmlns:p14="http://schemas.microsoft.com/office/powerpoint/2010/main" val="2879328736"/>
       </p:ext>
     </p:extLst>
   </p:cSld>
@@ -7971,6 +8911,35 @@
           <a:chExt cx="0" cy="0"/>
         </a:xfrm>
       </p:grpSpPr>
+      <p:pic>
+        <p:nvPicPr>
+          <p:cNvPr id="7" name="Content Placeholder 6">
+            <a:extLst>
+              <a:ext uri="{FF2B5EF4-FFF2-40B4-BE49-F238E27FC236}">
+                <a16:creationId xmlns:a16="http://schemas.microsoft.com/office/drawing/2014/main" id="{0E4529A5-E65F-404F-AF0D-7B17543000B2}"/>
+              </a:ext>
+            </a:extLst>
+          </p:cNvPr>
+          <p:cNvPicPr>
+            <a:picLocks noGrp="1" noChangeAspect="1"/>
+          </p:cNvPicPr>
+          <p:nvPr>
+            <p:ph idx="1"/>
+          </p:nvPr>
+        </p:nvPicPr>
+        <p:blipFill>
+          <a:blip r:embed="rId2"/>
+          <a:stretch>
+            <a:fillRect/>
+          </a:stretch>
+        </p:blipFill>
+        <p:spPr>
+          <a:xfrm>
+            <a:off x="3361960" y="298084"/>
+            <a:ext cx="3973023" cy="6261831"/>
+          </a:xfrm>
+        </p:spPr>
+      </p:pic>
       <p:sp>
         <p:nvSpPr>
           <p:cNvPr id="10" name="Rectangle 9">
@@ -8016,55 +8985,15 @@
             <a:pPr algn="ctr"/>
             <a:r>
               <a:rPr lang="en-US" dirty="0"/>
-              <a:t>How about we look at how long they have been in the list..</a:t>
-            </a:r>
-          </a:p>
-          <a:p>
-            <a:pPr algn="ctr"/>
-            <a:endParaRPr lang="en-US" dirty="0"/>
-          </a:p>
-          <a:p>
-            <a:pPr algn="ctr"/>
-            <a:r>
-              <a:rPr lang="en-US" dirty="0"/>
-              <a:t>Looks pretty stable</a:t>
-            </a:r>
-          </a:p>
-        </p:txBody>
-      </p:sp>
-      <p:pic>
-        <p:nvPicPr>
-          <p:cNvPr id="5" name="Content Placeholder 4">
-            <a:extLst>
-              <a:ext uri="{FF2B5EF4-FFF2-40B4-BE49-F238E27FC236}">
-                <a16:creationId xmlns:a16="http://schemas.microsoft.com/office/drawing/2014/main" id="{624F21B2-CE89-4C79-ADF7-7C4C479051C9}"/>
-              </a:ext>
-            </a:extLst>
-          </p:cNvPr>
-          <p:cNvPicPr>
-            <a:picLocks noGrp="1" noChangeAspect="1"/>
-          </p:cNvPicPr>
-          <p:nvPr>
-            <p:ph idx="1"/>
-          </p:nvPr>
-        </p:nvPicPr>
-        <p:blipFill>
-          <a:blip r:embed="rId2"/>
-          <a:stretch>
-            <a:fillRect/>
-          </a:stretch>
-        </p:blipFill>
-        <p:spPr>
-          <a:xfrm>
-            <a:off x="2729057" y="434647"/>
-            <a:ext cx="5131538" cy="6187719"/>
-          </a:xfrm>
-        </p:spPr>
-      </p:pic>
+              <a:t>A quick look at what made the top 20 in 2012</a:t>
+            </a:r>
+          </a:p>
+        </p:txBody>
+      </p:sp>
     </p:spTree>
     <p:extLst>
       <p:ext uri="{BB962C8B-B14F-4D97-AF65-F5344CB8AC3E}">
-        <p14:creationId xmlns:p14="http://schemas.microsoft.com/office/powerpoint/2010/main" val="2319040622"/>
+        <p14:creationId xmlns:p14="http://schemas.microsoft.com/office/powerpoint/2010/main" val="1890540436"/>
       </p:ext>
     </p:extLst>
   </p:cSld>

</xml_diff>

<commit_message>
Corrected URL in PPT
</commit_message>
<xml_diff>
--- a/Web Scraping Fortune 500 Archive.pptx
+++ b/Web Scraping Fortune 500 Archive.pptx
@@ -8242,12 +8242,52 @@
           </a:p>
           <a:p>
             <a:r>
+              <a:rPr lang="en-US" dirty="0">
+                <a:solidFill>
+                  <a:srgbClr val="92D050"/>
+                </a:solidFill>
+              </a:rPr>
+              <a:t>Data </a:t>
+            </a:r>
+            <a:r>
               <a:rPr lang="en-US">
                 <a:solidFill>
                   <a:srgbClr val="92D050"/>
                 </a:solidFill>
               </a:rPr>
-              <a:t>Data : http://archive.fortune.com/magazines/fortune/fortune500_archive/full/2000/</a:t>
+              <a:t>: https</a:t>
+            </a:r>
+            <a:r>
+              <a:rPr lang="en-US" dirty="0">
+                <a:solidFill>
+                  <a:srgbClr val="92D050"/>
+                </a:solidFill>
+              </a:rPr>
+              <a:t>://</a:t>
+            </a:r>
+            <a:r>
+              <a:rPr lang="en-US" dirty="0" err="1">
+                <a:solidFill>
+                  <a:srgbClr val="92D050"/>
+                </a:solidFill>
+              </a:rPr>
+              <a:t>money.cnn.com</a:t>
+            </a:r>
+            <a:r>
+              <a:rPr lang="en-US" dirty="0">
+                <a:solidFill>
+                  <a:srgbClr val="92D050"/>
+                </a:solidFill>
+              </a:rPr>
+              <a:t>/magazines/fortune/fortune500/2011/</a:t>
+            </a:r>
+            <a:r>
+              <a:rPr lang="en-US" dirty="0" err="1">
+                <a:solidFill>
+                  <a:srgbClr val="92D050"/>
+                </a:solidFill>
+              </a:rPr>
+              <a:t>index.html</a:t>
             </a:r>
             <a:endParaRPr lang="en-US" dirty="0">
               <a:solidFill>

</xml_diff>